<commit_message>
Updated with slides for Deliverable-2nd week presentations
</commit_message>
<xml_diff>
--- a/Presentation/NBA Player Analytics- Week 2 Deliverables.pptx
+++ b/Presentation/NBA Player Analytics- Week 2 Deliverables.pptx
@@ -6,11 +6,15 @@
   </p:sldMasterIdLst>
   <p:sldIdLst>
     <p:sldId id="256" r:id="rId2"/>
-    <p:sldId id="260" r:id="rId3"/>
-    <p:sldId id="261" r:id="rId4"/>
-    <p:sldId id="257" r:id="rId5"/>
-    <p:sldId id="258" r:id="rId6"/>
-    <p:sldId id="259" r:id="rId7"/>
+    <p:sldId id="262" r:id="rId3"/>
+    <p:sldId id="260" r:id="rId4"/>
+    <p:sldId id="261" r:id="rId5"/>
+    <p:sldId id="257" r:id="rId6"/>
+    <p:sldId id="258" r:id="rId7"/>
+    <p:sldId id="259" r:id="rId8"/>
+    <p:sldId id="264" r:id="rId9"/>
+    <p:sldId id="265" r:id="rId10"/>
+    <p:sldId id="266" r:id="rId11"/>
   </p:sldIdLst>
   <p:sldSz cx="12192000" cy="6858000"/>
   <p:notesSz cx="6858000" cy="9144000"/>
@@ -266,7 +270,7 @@
               <a:rPr lang="en-US" smtClean="0"/>
               <a:t>8/8/2021</a:t>
             </a:fld>
-            <a:endParaRPr lang="en-US"/>
+            <a:endParaRPr lang="en-US" dirty="0"/>
           </a:p>
         </p:txBody>
       </p:sp>
@@ -291,7 +295,7 @@
           <a:bodyPr/>
           <a:lstStyle/>
           <a:p>
-            <a:endParaRPr lang="en-US"/>
+            <a:endParaRPr lang="en-US" dirty="0"/>
           </a:p>
         </p:txBody>
       </p:sp>
@@ -320,7 +324,7 @@
               <a:rPr lang="en-US" smtClean="0"/>
               <a:t>‹#›</a:t>
             </a:fld>
-            <a:endParaRPr lang="en-US"/>
+            <a:endParaRPr lang="en-US" dirty="0"/>
           </a:p>
         </p:txBody>
       </p:sp>
@@ -464,7 +468,7 @@
               <a:rPr lang="en-US" smtClean="0"/>
               <a:t>8/8/2021</a:t>
             </a:fld>
-            <a:endParaRPr lang="en-US"/>
+            <a:endParaRPr lang="en-US" dirty="0"/>
           </a:p>
         </p:txBody>
       </p:sp>
@@ -489,7 +493,7 @@
           <a:bodyPr/>
           <a:lstStyle/>
           <a:p>
-            <a:endParaRPr lang="en-US"/>
+            <a:endParaRPr lang="en-US" dirty="0"/>
           </a:p>
         </p:txBody>
       </p:sp>
@@ -518,7 +522,7 @@
               <a:rPr lang="en-US" smtClean="0"/>
               <a:t>‹#›</a:t>
             </a:fld>
-            <a:endParaRPr lang="en-US"/>
+            <a:endParaRPr lang="en-US" dirty="0"/>
           </a:p>
         </p:txBody>
       </p:sp>
@@ -672,7 +676,7 @@
               <a:rPr lang="en-US" smtClean="0"/>
               <a:t>8/8/2021</a:t>
             </a:fld>
-            <a:endParaRPr lang="en-US"/>
+            <a:endParaRPr lang="en-US" dirty="0"/>
           </a:p>
         </p:txBody>
       </p:sp>
@@ -697,7 +701,7 @@
           <a:bodyPr/>
           <a:lstStyle/>
           <a:p>
-            <a:endParaRPr lang="en-US"/>
+            <a:endParaRPr lang="en-US" dirty="0"/>
           </a:p>
         </p:txBody>
       </p:sp>
@@ -726,7 +730,7 @@
               <a:rPr lang="en-US" smtClean="0"/>
               <a:t>‹#›</a:t>
             </a:fld>
-            <a:endParaRPr lang="en-US"/>
+            <a:endParaRPr lang="en-US" dirty="0"/>
           </a:p>
         </p:txBody>
       </p:sp>
@@ -870,7 +874,7 @@
               <a:rPr lang="en-US" smtClean="0"/>
               <a:t>8/8/2021</a:t>
             </a:fld>
-            <a:endParaRPr lang="en-US"/>
+            <a:endParaRPr lang="en-US" dirty="0"/>
           </a:p>
         </p:txBody>
       </p:sp>
@@ -895,7 +899,7 @@
           <a:bodyPr/>
           <a:lstStyle/>
           <a:p>
-            <a:endParaRPr lang="en-US"/>
+            <a:endParaRPr lang="en-US" dirty="0"/>
           </a:p>
         </p:txBody>
       </p:sp>
@@ -924,7 +928,7 @@
               <a:rPr lang="en-US" smtClean="0"/>
               <a:t>‹#›</a:t>
             </a:fld>
-            <a:endParaRPr lang="en-US"/>
+            <a:endParaRPr lang="en-US" dirty="0"/>
           </a:p>
         </p:txBody>
       </p:sp>
@@ -1145,7 +1149,7 @@
               <a:rPr lang="en-US" smtClean="0"/>
               <a:t>8/8/2021</a:t>
             </a:fld>
-            <a:endParaRPr lang="en-US"/>
+            <a:endParaRPr lang="en-US" dirty="0"/>
           </a:p>
         </p:txBody>
       </p:sp>
@@ -1170,7 +1174,7 @@
           <a:bodyPr/>
           <a:lstStyle/>
           <a:p>
-            <a:endParaRPr lang="en-US"/>
+            <a:endParaRPr lang="en-US" dirty="0"/>
           </a:p>
         </p:txBody>
       </p:sp>
@@ -1199,7 +1203,7 @@
               <a:rPr lang="en-US" smtClean="0"/>
               <a:t>‹#›</a:t>
             </a:fld>
-            <a:endParaRPr lang="en-US"/>
+            <a:endParaRPr lang="en-US" dirty="0"/>
           </a:p>
         </p:txBody>
       </p:sp>
@@ -1410,7 +1414,7 @@
               <a:rPr lang="en-US" smtClean="0"/>
               <a:t>8/8/2021</a:t>
             </a:fld>
-            <a:endParaRPr lang="en-US"/>
+            <a:endParaRPr lang="en-US" dirty="0"/>
           </a:p>
         </p:txBody>
       </p:sp>
@@ -1435,7 +1439,7 @@
           <a:bodyPr/>
           <a:lstStyle/>
           <a:p>
-            <a:endParaRPr lang="en-US"/>
+            <a:endParaRPr lang="en-US" dirty="0"/>
           </a:p>
         </p:txBody>
       </p:sp>
@@ -1464,7 +1468,7 @@
               <a:rPr lang="en-US" smtClean="0"/>
               <a:t>‹#›</a:t>
             </a:fld>
-            <a:endParaRPr lang="en-US"/>
+            <a:endParaRPr lang="en-US" dirty="0"/>
           </a:p>
         </p:txBody>
       </p:sp>
@@ -1822,7 +1826,7 @@
               <a:rPr lang="en-US" smtClean="0"/>
               <a:t>8/8/2021</a:t>
             </a:fld>
-            <a:endParaRPr lang="en-US"/>
+            <a:endParaRPr lang="en-US" dirty="0"/>
           </a:p>
         </p:txBody>
       </p:sp>
@@ -1847,7 +1851,7 @@
           <a:bodyPr/>
           <a:lstStyle/>
           <a:p>
-            <a:endParaRPr lang="en-US"/>
+            <a:endParaRPr lang="en-US" dirty="0"/>
           </a:p>
         </p:txBody>
       </p:sp>
@@ -1876,7 +1880,7 @@
               <a:rPr lang="en-US" smtClean="0"/>
               <a:t>‹#›</a:t>
             </a:fld>
-            <a:endParaRPr lang="en-US"/>
+            <a:endParaRPr lang="en-US" dirty="0"/>
           </a:p>
         </p:txBody>
       </p:sp>
@@ -1963,7 +1967,7 @@
               <a:rPr lang="en-US" smtClean="0"/>
               <a:t>8/8/2021</a:t>
             </a:fld>
-            <a:endParaRPr lang="en-US"/>
+            <a:endParaRPr lang="en-US" dirty="0"/>
           </a:p>
         </p:txBody>
       </p:sp>
@@ -1988,7 +1992,7 @@
           <a:bodyPr/>
           <a:lstStyle/>
           <a:p>
-            <a:endParaRPr lang="en-US"/>
+            <a:endParaRPr lang="en-US" dirty="0"/>
           </a:p>
         </p:txBody>
       </p:sp>
@@ -2017,7 +2021,7 @@
               <a:rPr lang="en-US" smtClean="0"/>
               <a:t>‹#›</a:t>
             </a:fld>
-            <a:endParaRPr lang="en-US"/>
+            <a:endParaRPr lang="en-US" dirty="0"/>
           </a:p>
         </p:txBody>
       </p:sp>
@@ -2076,7 +2080,7 @@
               <a:rPr lang="en-US" smtClean="0"/>
               <a:t>8/8/2021</a:t>
             </a:fld>
-            <a:endParaRPr lang="en-US"/>
+            <a:endParaRPr lang="en-US" dirty="0"/>
           </a:p>
         </p:txBody>
       </p:sp>
@@ -2101,7 +2105,7 @@
           <a:bodyPr/>
           <a:lstStyle/>
           <a:p>
-            <a:endParaRPr lang="en-US"/>
+            <a:endParaRPr lang="en-US" dirty="0"/>
           </a:p>
         </p:txBody>
       </p:sp>
@@ -2130,7 +2134,7 @@
               <a:rPr lang="en-US" smtClean="0"/>
               <a:t>‹#›</a:t>
             </a:fld>
-            <a:endParaRPr lang="en-US"/>
+            <a:endParaRPr lang="en-US" dirty="0"/>
           </a:p>
         </p:txBody>
       </p:sp>
@@ -2387,7 +2391,7 @@
               <a:rPr lang="en-US" smtClean="0"/>
               <a:t>8/8/2021</a:t>
             </a:fld>
-            <a:endParaRPr lang="en-US"/>
+            <a:endParaRPr lang="en-US" dirty="0"/>
           </a:p>
         </p:txBody>
       </p:sp>
@@ -2412,7 +2416,7 @@
           <a:bodyPr/>
           <a:lstStyle/>
           <a:p>
-            <a:endParaRPr lang="en-US"/>
+            <a:endParaRPr lang="en-US" dirty="0"/>
           </a:p>
         </p:txBody>
       </p:sp>
@@ -2441,7 +2445,7 @@
               <a:rPr lang="en-US" smtClean="0"/>
               <a:t>‹#›</a:t>
             </a:fld>
-            <a:endParaRPr lang="en-US"/>
+            <a:endParaRPr lang="en-US" dirty="0"/>
           </a:p>
         </p:txBody>
       </p:sp>
@@ -2575,7 +2579,7 @@
             </a:lvl9pPr>
           </a:lstStyle>
           <a:p>
-            <a:endParaRPr lang="en-US"/>
+            <a:endParaRPr lang="en-US" dirty="0"/>
           </a:p>
         </p:txBody>
       </p:sp>
@@ -2675,7 +2679,7 @@
               <a:rPr lang="en-US" smtClean="0"/>
               <a:t>8/8/2021</a:t>
             </a:fld>
-            <a:endParaRPr lang="en-US"/>
+            <a:endParaRPr lang="en-US" dirty="0"/>
           </a:p>
         </p:txBody>
       </p:sp>
@@ -2700,7 +2704,7 @@
           <a:bodyPr/>
           <a:lstStyle/>
           <a:p>
-            <a:endParaRPr lang="en-US"/>
+            <a:endParaRPr lang="en-US" dirty="0"/>
           </a:p>
         </p:txBody>
       </p:sp>
@@ -2729,7 +2733,7 @@
               <a:rPr lang="en-US" smtClean="0"/>
               <a:t>‹#›</a:t>
             </a:fld>
-            <a:endParaRPr lang="en-US"/>
+            <a:endParaRPr lang="en-US" dirty="0"/>
           </a:p>
         </p:txBody>
       </p:sp>
@@ -2916,7 +2920,7 @@
               <a:rPr lang="en-US" smtClean="0"/>
               <a:t>8/8/2021</a:t>
             </a:fld>
-            <a:endParaRPr lang="en-US"/>
+            <a:endParaRPr lang="en-US" dirty="0"/>
           </a:p>
         </p:txBody>
       </p:sp>
@@ -2959,7 +2963,7 @@
             </a:lvl1pPr>
           </a:lstStyle>
           <a:p>
-            <a:endParaRPr lang="en-US"/>
+            <a:endParaRPr lang="en-US" dirty="0"/>
           </a:p>
         </p:txBody>
       </p:sp>
@@ -3006,7 +3010,7 @@
               <a:rPr lang="en-US" smtClean="0"/>
               <a:t>‹#›</a:t>
             </a:fld>
-            <a:endParaRPr lang="en-US"/>
+            <a:endParaRPr lang="en-US" dirty="0"/>
           </a:p>
         </p:txBody>
       </p:sp>
@@ -3518,7 +3522,421 @@
 </p:sld>
 </file>
 
+<file path=ppt/slides/slide10.xml><?xml version="1.0" encoding="utf-8"?>
+<p:sld xmlns:a="http://schemas.openxmlformats.org/drawingml/2006/main" xmlns:r="http://schemas.openxmlformats.org/officeDocument/2006/relationships" xmlns:p="http://schemas.openxmlformats.org/presentationml/2006/main">
+  <p:cSld>
+    <p:spTree>
+      <p:nvGrpSpPr>
+        <p:cNvPr id="1" name=""/>
+        <p:cNvGrpSpPr/>
+        <p:nvPr/>
+      </p:nvGrpSpPr>
+      <p:grpSpPr>
+        <a:xfrm>
+          <a:off x="0" y="0"/>
+          <a:ext cx="0" cy="0"/>
+          <a:chOff x="0" y="0"/>
+          <a:chExt cx="0" cy="0"/>
+        </a:xfrm>
+      </p:grpSpPr>
+      <p:sp>
+        <p:nvSpPr>
+          <p:cNvPr id="2" name="TextBox 1">
+            <a:extLst>
+              <a:ext uri="{FF2B5EF4-FFF2-40B4-BE49-F238E27FC236}">
+                <a16:creationId xmlns:a16="http://schemas.microsoft.com/office/drawing/2014/main" id="{12607C7C-BFF0-472D-A12F-D6A4776DE6C2}"/>
+              </a:ext>
+            </a:extLst>
+          </p:cNvPr>
+          <p:cNvSpPr txBox="1"/>
+          <p:nvPr/>
+        </p:nvSpPr>
+        <p:spPr>
+          <a:xfrm>
+            <a:off x="0" y="201336"/>
+            <a:ext cx="10737908" cy="369332"/>
+          </a:xfrm>
+          <a:prstGeom prst="rect">
+            <a:avLst/>
+          </a:prstGeom>
+          <a:noFill/>
+        </p:spPr>
+        <p:txBody>
+          <a:bodyPr wrap="square" rtlCol="0">
+            <a:spAutoFit/>
+          </a:bodyPr>
+          <a:lstStyle/>
+          <a:p>
+            <a:r>
+              <a:rPr lang="en-US" dirty="0"/>
+              <a:t>Supervised Learning to predict whether Player’s salary hike will happen or not:</a:t>
+            </a:r>
+          </a:p>
+        </p:txBody>
+      </p:sp>
+      <p:sp>
+        <p:nvSpPr>
+          <p:cNvPr id="8" name="TextBox 7">
+            <a:extLst>
+              <a:ext uri="{FF2B5EF4-FFF2-40B4-BE49-F238E27FC236}">
+                <a16:creationId xmlns:a16="http://schemas.microsoft.com/office/drawing/2014/main" id="{01C0E6B8-65BD-4537-9414-B982733F8873}"/>
+              </a:ext>
+            </a:extLst>
+          </p:cNvPr>
+          <p:cNvSpPr txBox="1"/>
+          <p:nvPr/>
+        </p:nvSpPr>
+        <p:spPr>
+          <a:xfrm>
+            <a:off x="-13982" y="768902"/>
+            <a:ext cx="11481731" cy="7894469"/>
+          </a:xfrm>
+          <a:prstGeom prst="rect">
+            <a:avLst/>
+          </a:prstGeom>
+          <a:noFill/>
+        </p:spPr>
+        <p:txBody>
+          <a:bodyPr wrap="square" rtlCol="0">
+            <a:spAutoFit/>
+          </a:bodyPr>
+          <a:lstStyle/>
+          <a:p>
+            <a:r>
+              <a:rPr lang="en-US" dirty="0"/>
+              <a:t>Description of preliminary data processing:– </a:t>
+            </a:r>
+          </a:p>
+          <a:p>
+            <a:pPr marL="285750" indent="-285750">
+              <a:buFont typeface="Wingdings" panose="05000000000000000000" pitchFamily="2" charset="2"/>
+              <a:buChar char="Ø"/>
+            </a:pPr>
+            <a:r>
+              <a:rPr lang="en-US" dirty="0"/>
+              <a:t>	</a:t>
+            </a:r>
+            <a:r>
+              <a:rPr lang="en-US" sz="1500" dirty="0"/>
+              <a:t>Both player salary and player statistics data need to be referenced from database (Status – In- progress)</a:t>
+            </a:r>
+          </a:p>
+          <a:p>
+            <a:pPr marL="285750" indent="-285750">
+              <a:buFont typeface="Wingdings" panose="05000000000000000000" pitchFamily="2" charset="2"/>
+              <a:buChar char="Ø"/>
+            </a:pPr>
+            <a:r>
+              <a:rPr lang="en-US" sz="1500" dirty="0"/>
+              <a:t>	Consider players who have played all 4 seasons (2016-17, 2018-19,2019-20,2020-21) for machine learning (Status – In-progress)</a:t>
+            </a:r>
+          </a:p>
+          <a:p>
+            <a:pPr marL="285750" indent="-285750">
+              <a:buFont typeface="Wingdings" panose="05000000000000000000" pitchFamily="2" charset="2"/>
+              <a:buChar char="Ø"/>
+            </a:pPr>
+            <a:r>
+              <a:rPr lang="en-US" sz="1500" dirty="0"/>
+              <a:t>               Join player statistics and  player salary and average the stats and salary per player (Status - Complete)</a:t>
+            </a:r>
+          </a:p>
+          <a:p>
+            <a:pPr marL="285750" indent="-285750">
+              <a:buFont typeface="Wingdings" panose="05000000000000000000" pitchFamily="2" charset="2"/>
+              <a:buChar char="Ø"/>
+            </a:pPr>
+            <a:r>
+              <a:rPr lang="en-US" sz="1500" dirty="0"/>
+              <a:t>	Label the ‘Salary Increased or not’ by comparing the last year Vs First year salary of the players (Status – In-progress)</a:t>
+            </a:r>
+          </a:p>
+          <a:p>
+            <a:pPr marL="285750" indent="-285750">
+              <a:buFont typeface="Wingdings" panose="05000000000000000000" pitchFamily="2" charset="2"/>
+              <a:buChar char="Ø"/>
+            </a:pPr>
+            <a:r>
+              <a:rPr lang="en-US" sz="1500" dirty="0"/>
+              <a:t>	Train and Test the model through Random forest. </a:t>
+            </a:r>
+            <a:endParaRPr lang="en-US" dirty="0"/>
+          </a:p>
+          <a:p>
+            <a:endParaRPr lang="en-US" dirty="0"/>
+          </a:p>
+          <a:p>
+            <a:r>
+              <a:rPr lang="en-US" dirty="0"/>
+              <a:t>The code git hub link is as follows:- </a:t>
+            </a:r>
+          </a:p>
+          <a:p>
+            <a:r>
+              <a:rPr lang="en-US" dirty="0"/>
+              <a:t>	</a:t>
+            </a:r>
+            <a:r>
+              <a:rPr lang="en-US" dirty="0">
+                <a:hlinkClick r:id="rId2"/>
+              </a:rPr>
+              <a:t>http://localhost:8888/notebooks/player-salaryraise-predictions.ipynb</a:t>
+            </a:r>
+            <a:endParaRPr lang="en-US" dirty="0"/>
+          </a:p>
+          <a:p>
+            <a:endParaRPr lang="en-US" dirty="0"/>
+          </a:p>
+          <a:p>
+            <a:r>
+              <a:rPr lang="en-US" dirty="0"/>
+              <a:t>Reason why player statics only considered as feature:-</a:t>
+            </a:r>
+          </a:p>
+          <a:p>
+            <a:pPr marL="285750" indent="-285750">
+              <a:buFont typeface="Wingdings" panose="05000000000000000000" pitchFamily="2" charset="2"/>
+              <a:buChar char="ü"/>
+            </a:pPr>
+            <a:r>
+              <a:rPr lang="en-US" dirty="0"/>
+              <a:t>      	 </a:t>
+            </a:r>
+            <a:r>
+              <a:rPr lang="en-US" sz="1500" dirty="0"/>
+              <a:t>Player statistics like ‘np_of_ghames-played’, ‘no_minutes_played’, ‘field_goals_pctg’, ‘three_point_pctg’,    	‘effective_field_goal_pctg’,  ‘free_throws_pctg’, ‘ total_rebounds’ ,’ no_of_assists’ ,’ no_of_steals’,</a:t>
+            </a:r>
+          </a:p>
+          <a:p>
+            <a:r>
+              <a:rPr lang="en-US" sz="1500" dirty="0"/>
+              <a:t>	‘no_of_blocks’,’ no_of_turnovers’, ‘points’ , ‘salary_increased_or_not’ have been considered as features for training and testing.</a:t>
+            </a:r>
+          </a:p>
+          <a:p>
+            <a:endParaRPr lang="en-US" dirty="0"/>
+          </a:p>
+          <a:p>
+            <a:r>
+              <a:rPr lang="en-US" dirty="0"/>
+              <a:t>Why Random Forest is used, its advantage and limitations:- </a:t>
+            </a:r>
+          </a:p>
+          <a:p>
+            <a:pPr marL="285750" indent="-285750">
+              <a:buFont typeface="Wingdings" panose="05000000000000000000" pitchFamily="2" charset="2"/>
+              <a:buChar char="ü"/>
+            </a:pPr>
+            <a:r>
+              <a:rPr lang="en-US" sz="1500" dirty="0"/>
+              <a:t>    	Randomforest  is one of the most popular algoritm for supervised learning to do more accurate predictions.</a:t>
+            </a:r>
+          </a:p>
+          <a:p>
+            <a:pPr marL="285750" indent="-285750">
+              <a:buFont typeface="Wingdings" panose="05000000000000000000" pitchFamily="2" charset="2"/>
+              <a:buChar char="ü"/>
+            </a:pPr>
+            <a:r>
+              <a:rPr lang="en-US" sz="1500" dirty="0"/>
+              <a:t>        	Benefits  of Kmeans –  Simple to implement and since it builds multiple decision trees and merges them together to get more accurate and stable decisions.</a:t>
+            </a:r>
+          </a:p>
+          <a:p>
+            <a:pPr marL="285750" indent="-285750">
+              <a:buFont typeface="Wingdings" panose="05000000000000000000" pitchFamily="2" charset="2"/>
+              <a:buChar char="ü"/>
+            </a:pPr>
+            <a:r>
+              <a:rPr lang="en-US" sz="1500" dirty="0"/>
+              <a:t>        	Limitations of Random Forest -  Need to be carefully observed because it has a chance of overfitting the model.</a:t>
+            </a:r>
+          </a:p>
+          <a:p>
+            <a:r>
+              <a:rPr lang="en-US" dirty="0"/>
+              <a:t>Conclusion:- </a:t>
+            </a:r>
+          </a:p>
+          <a:p>
+            <a:pPr marL="285750" indent="-285750">
+              <a:buFont typeface="Wingdings" panose="05000000000000000000" pitchFamily="2" charset="2"/>
+              <a:buChar char="Ø"/>
+            </a:pPr>
+            <a:r>
+              <a:rPr lang="en-US" dirty="0"/>
+              <a:t>         	</a:t>
+            </a:r>
+            <a:r>
+              <a:rPr lang="en-US" sz="1500" dirty="0"/>
+              <a:t>This whole machine learning modeling is coded on the top of sample data. The accuracy and confusion metrics will change once the model is trained with real data.</a:t>
+            </a:r>
+            <a:endParaRPr lang="en-US" dirty="0"/>
+          </a:p>
+          <a:p>
+            <a:r>
+              <a:rPr lang="en-US" dirty="0"/>
+              <a:t>         	</a:t>
+            </a:r>
+          </a:p>
+          <a:p>
+            <a:endParaRPr lang="en-US" dirty="0"/>
+          </a:p>
+          <a:p>
+            <a:r>
+              <a:rPr lang="en-US" dirty="0"/>
+              <a:t>        </a:t>
+            </a:r>
+          </a:p>
+          <a:p>
+            <a:endParaRPr lang="en-US" dirty="0"/>
+          </a:p>
+          <a:p>
+            <a:endParaRPr lang="en-US" dirty="0"/>
+          </a:p>
+          <a:p>
+            <a:endParaRPr lang="en-US" dirty="0"/>
+          </a:p>
+          <a:p>
+            <a:endParaRPr lang="en-US" dirty="0"/>
+          </a:p>
+        </p:txBody>
+      </p:sp>
+    </p:spTree>
+    <p:extLst>
+      <p:ext uri="{BB962C8B-B14F-4D97-AF65-F5344CB8AC3E}">
+        <p14:creationId xmlns:p14="http://schemas.microsoft.com/office/powerpoint/2010/main" val="438658562"/>
+      </p:ext>
+    </p:extLst>
+  </p:cSld>
+  <p:clrMapOvr>
+    <a:masterClrMapping/>
+  </p:clrMapOvr>
+</p:sld>
+</file>
+
 <file path=ppt/slides/slide2.xml><?xml version="1.0" encoding="utf-8"?>
+<p:sld xmlns:a="http://schemas.openxmlformats.org/drawingml/2006/main" xmlns:r="http://schemas.openxmlformats.org/officeDocument/2006/relationships" xmlns:p="http://schemas.openxmlformats.org/presentationml/2006/main">
+  <p:cSld>
+    <p:spTree>
+      <p:nvGrpSpPr>
+        <p:cNvPr id="1" name=""/>
+        <p:cNvGrpSpPr/>
+        <p:nvPr/>
+      </p:nvGrpSpPr>
+      <p:grpSpPr>
+        <a:xfrm>
+          <a:off x="0" y="0"/>
+          <a:ext cx="0" cy="0"/>
+          <a:chOff x="0" y="0"/>
+          <a:chExt cx="0" cy="0"/>
+        </a:xfrm>
+      </p:grpSpPr>
+      <p:sp>
+        <p:nvSpPr>
+          <p:cNvPr id="2" name="Title 1">
+            <a:extLst>
+              <a:ext uri="{FF2B5EF4-FFF2-40B4-BE49-F238E27FC236}">
+                <a16:creationId xmlns:a16="http://schemas.microsoft.com/office/drawing/2014/main" id="{628B95FA-CA7D-4CB0-952B-0F5F91D31C45}"/>
+              </a:ext>
+            </a:extLst>
+          </p:cNvPr>
+          <p:cNvSpPr>
+            <a:spLocks noGrp="1"/>
+          </p:cNvSpPr>
+          <p:nvPr>
+            <p:ph type="ctrTitle"/>
+          </p:nvPr>
+        </p:nvSpPr>
+        <p:spPr/>
+        <p:txBody>
+          <a:bodyPr>
+            <a:normAutofit/>
+          </a:bodyPr>
+          <a:lstStyle/>
+          <a:p>
+            <a:r>
+              <a:rPr lang="en-US" sz="4400" b="0" i="0" u="none" strike="noStrike" dirty="0">
+                <a:solidFill>
+                  <a:srgbClr val="000000"/>
+                </a:solidFill>
+                <a:effectLst/>
+                <a:latin typeface="Arial" panose="020B0604020202020204" pitchFamily="34" charset="0"/>
+              </a:rPr>
+              <a:t>Presentation </a:t>
+            </a:r>
+            <a:br>
+              <a:rPr lang="en-US" sz="4400" b="0" i="0" u="none" strike="noStrike" dirty="0">
+                <a:solidFill>
+                  <a:srgbClr val="000000"/>
+                </a:solidFill>
+                <a:effectLst/>
+                <a:latin typeface="Arial" panose="020B0604020202020204" pitchFamily="34" charset="0"/>
+              </a:rPr>
+            </a:br>
+            <a:r>
+              <a:rPr lang="en-US" sz="4400" b="0" i="0" u="none" strike="noStrike" dirty="0">
+                <a:solidFill>
+                  <a:srgbClr val="000000"/>
+                </a:solidFill>
+                <a:effectLst/>
+                <a:latin typeface="Arial" panose="020B0604020202020204" pitchFamily="34" charset="0"/>
+              </a:rPr>
+              <a:t>                        </a:t>
+            </a:r>
+            <a:endParaRPr lang="en-US" sz="2400" dirty="0"/>
+          </a:p>
+        </p:txBody>
+      </p:sp>
+      <p:sp>
+        <p:nvSpPr>
+          <p:cNvPr id="3" name="Subtitle 2">
+            <a:extLst>
+              <a:ext uri="{FF2B5EF4-FFF2-40B4-BE49-F238E27FC236}">
+                <a16:creationId xmlns:a16="http://schemas.microsoft.com/office/drawing/2014/main" id="{49F45D17-E9F7-4B72-9F45-A18DE64ABBE2}"/>
+              </a:ext>
+            </a:extLst>
+          </p:cNvPr>
+          <p:cNvSpPr>
+            <a:spLocks noGrp="1"/>
+          </p:cNvSpPr>
+          <p:nvPr>
+            <p:ph type="subTitle" idx="1"/>
+          </p:nvPr>
+        </p:nvSpPr>
+        <p:spPr>
+          <a:xfrm>
+            <a:off x="-2896998" y="4558383"/>
+            <a:ext cx="9144000" cy="1655762"/>
+          </a:xfrm>
+        </p:spPr>
+        <p:txBody>
+          <a:bodyPr>
+            <a:normAutofit/>
+          </a:bodyPr>
+          <a:lstStyle/>
+          <a:p>
+            <a:br>
+              <a:rPr lang="en-US" dirty="0"/>
+            </a:br>
+            <a:endParaRPr lang="en-US" dirty="0"/>
+          </a:p>
+        </p:txBody>
+      </p:sp>
+    </p:spTree>
+    <p:extLst>
+      <p:ext uri="{BB962C8B-B14F-4D97-AF65-F5344CB8AC3E}">
+        <p14:creationId xmlns:p14="http://schemas.microsoft.com/office/powerpoint/2010/main" val="3004993549"/>
+      </p:ext>
+    </p:extLst>
+  </p:cSld>
+  <p:clrMapOvr>
+    <a:masterClrMapping/>
+  </p:clrMapOvr>
+</p:sld>
+</file>
+
+<file path=ppt/slides/slide3.xml><?xml version="1.0" encoding="utf-8"?>
 <p:sld xmlns:a="http://schemas.openxmlformats.org/drawingml/2006/main" xmlns:r="http://schemas.openxmlformats.org/officeDocument/2006/relationships" xmlns:p="http://schemas.openxmlformats.org/presentationml/2006/main">
   <p:cSld>
     <p:spTree>
@@ -3908,7 +4326,7 @@
 </p:sld>
 </file>
 
-<file path=ppt/slides/slide3.xml><?xml version="1.0" encoding="utf-8"?>
+<file path=ppt/slides/slide4.xml><?xml version="1.0" encoding="utf-8"?>
 <p:sld xmlns:a="http://schemas.openxmlformats.org/drawingml/2006/main" xmlns:r="http://schemas.openxmlformats.org/officeDocument/2006/relationships" xmlns:p="http://schemas.openxmlformats.org/presentationml/2006/main">
   <p:cSld>
     <p:spTree>
@@ -4056,33 +4474,23 @@
           </a:p>
           <a:p>
             <a:r>
-              <a:rPr lang="en-US" dirty="0" err="1">
+              <a:rPr lang="en-US" dirty="0">
                 <a:solidFill>
                   <a:schemeClr val="tx1"/>
                 </a:solidFill>
               </a:rPr>
               <a:t>Xxxxxxxxxxxx</a:t>
             </a:r>
-            <a:endParaRPr lang="en-US" dirty="0">
-              <a:solidFill>
-                <a:schemeClr val="tx1"/>
-              </a:solidFill>
-            </a:endParaRPr>
-          </a:p>
-          <a:p>
-            <a:r>
-              <a:rPr lang="en-US" dirty="0" err="1">
+          </a:p>
+          <a:p>
+            <a:r>
+              <a:rPr lang="en-US" dirty="0">
                 <a:solidFill>
                   <a:schemeClr val="tx1"/>
                 </a:solidFill>
               </a:rPr>
               <a:t>xxxxxxxxxxxx</a:t>
             </a:r>
-            <a:endParaRPr lang="en-US" dirty="0">
-              <a:solidFill>
-                <a:schemeClr val="tx1"/>
-              </a:solidFill>
-            </a:endParaRPr>
           </a:p>
           <a:p>
             <a:endParaRPr lang="en-US" dirty="0">
@@ -4153,23 +4561,7 @@
                   <a:schemeClr val="tx1"/>
                 </a:solidFill>
               </a:rPr>
-              <a:t>Top players for each of the stats (</a:t>
-            </a:r>
-            <a:r>
-              <a:rPr lang="en-US" dirty="0" err="1">
-                <a:solidFill>
-                  <a:schemeClr val="tx1"/>
-                </a:solidFill>
-              </a:rPr>
-              <a:t>eg</a:t>
-            </a:r>
-            <a:r>
-              <a:rPr lang="en-US" dirty="0">
-                <a:solidFill>
-                  <a:schemeClr val="tx1"/>
-                </a:solidFill>
-              </a:rPr>
-              <a:t>: 3P, ASST, BLK..)</a:t>
+              <a:t>Top players for each of the stats (eg: 3P, ASST, BLK..)</a:t>
             </a:r>
           </a:p>
           <a:p>
@@ -4368,7 +4760,7 @@
 </p:sld>
 </file>
 
-<file path=ppt/slides/slide4.xml><?xml version="1.0" encoding="utf-8"?>
+<file path=ppt/slides/slide5.xml><?xml version="1.0" encoding="utf-8"?>
 <p:sld xmlns:a="http://schemas.openxmlformats.org/drawingml/2006/main" xmlns:r="http://schemas.openxmlformats.org/officeDocument/2006/relationships" xmlns:p="http://schemas.openxmlformats.org/presentationml/2006/main">
   <p:cSld>
     <p:spTree>
@@ -4631,7 +5023,7 @@
 </p:sld>
 </file>
 
-<file path=ppt/slides/slide5.xml><?xml version="1.0" encoding="utf-8"?>
+<file path=ppt/slides/slide6.xml><?xml version="1.0" encoding="utf-8"?>
 <p:sld xmlns:a="http://schemas.openxmlformats.org/drawingml/2006/main" xmlns:r="http://schemas.openxmlformats.org/officeDocument/2006/relationships" xmlns:p="http://schemas.openxmlformats.org/presentationml/2006/main">
   <p:cSld>
     <p:spTree>
@@ -4956,7 +5348,7 @@
 </p:sld>
 </file>
 
-<file path=ppt/slides/slide6.xml><?xml version="1.0" encoding="utf-8"?>
+<file path=ppt/slides/slide7.xml><?xml version="1.0" encoding="utf-8"?>
 <p:sld xmlns:a="http://schemas.openxmlformats.org/drawingml/2006/main" xmlns:r="http://schemas.openxmlformats.org/officeDocument/2006/relationships" xmlns:p="http://schemas.openxmlformats.org/presentationml/2006/main">
   <p:cSld>
     <p:spTree>
@@ -5169,6 +5561,437 @@
     <p:extLst>
       <p:ext uri="{BB962C8B-B14F-4D97-AF65-F5344CB8AC3E}">
         <p14:creationId xmlns:p14="http://schemas.microsoft.com/office/powerpoint/2010/main" val="1965671120"/>
+      </p:ext>
+    </p:extLst>
+  </p:cSld>
+  <p:clrMapOvr>
+    <a:masterClrMapping/>
+  </p:clrMapOvr>
+</p:sld>
+</file>
+
+<file path=ppt/slides/slide8.xml><?xml version="1.0" encoding="utf-8"?>
+<p:sld xmlns:a="http://schemas.openxmlformats.org/drawingml/2006/main" xmlns:r="http://schemas.openxmlformats.org/officeDocument/2006/relationships" xmlns:p="http://schemas.openxmlformats.org/presentationml/2006/main">
+  <p:cSld>
+    <p:spTree>
+      <p:nvGrpSpPr>
+        <p:cNvPr id="1" name=""/>
+        <p:cNvGrpSpPr/>
+        <p:nvPr/>
+      </p:nvGrpSpPr>
+      <p:grpSpPr>
+        <a:xfrm>
+          <a:off x="0" y="0"/>
+          <a:ext cx="0" cy="0"/>
+          <a:chOff x="0" y="0"/>
+          <a:chExt cx="0" cy="0"/>
+        </a:xfrm>
+      </p:grpSpPr>
+      <p:sp>
+        <p:nvSpPr>
+          <p:cNvPr id="2" name="Title 1">
+            <a:extLst>
+              <a:ext uri="{FF2B5EF4-FFF2-40B4-BE49-F238E27FC236}">
+                <a16:creationId xmlns:a16="http://schemas.microsoft.com/office/drawing/2014/main" id="{628B95FA-CA7D-4CB0-952B-0F5F91D31C45}"/>
+              </a:ext>
+            </a:extLst>
+          </p:cNvPr>
+          <p:cNvSpPr>
+            <a:spLocks noGrp="1"/>
+          </p:cNvSpPr>
+          <p:nvPr>
+            <p:ph type="ctrTitle"/>
+          </p:nvPr>
+        </p:nvSpPr>
+        <p:spPr/>
+        <p:txBody>
+          <a:bodyPr>
+            <a:normAutofit/>
+          </a:bodyPr>
+          <a:lstStyle/>
+          <a:p>
+            <a:r>
+              <a:rPr lang="en-US" sz="4400" dirty="0">
+                <a:solidFill>
+                  <a:srgbClr val="000000"/>
+                </a:solidFill>
+                <a:latin typeface="Arial" panose="020B0604020202020204" pitchFamily="34" charset="0"/>
+              </a:rPr>
+              <a:t>Machine Learning Model</a:t>
+            </a:r>
+            <a:r>
+              <a:rPr lang="en-US" sz="4400" b="0" i="0" u="none" strike="noStrike" dirty="0">
+                <a:solidFill>
+                  <a:srgbClr val="000000"/>
+                </a:solidFill>
+                <a:effectLst/>
+                <a:latin typeface="Arial" panose="020B0604020202020204" pitchFamily="34" charset="0"/>
+              </a:rPr>
+              <a:t> </a:t>
+            </a:r>
+            <a:br>
+              <a:rPr lang="en-US" sz="4400" b="0" i="0" u="none" strike="noStrike" dirty="0">
+                <a:solidFill>
+                  <a:srgbClr val="000000"/>
+                </a:solidFill>
+                <a:effectLst/>
+                <a:latin typeface="Arial" panose="020B0604020202020204" pitchFamily="34" charset="0"/>
+              </a:rPr>
+            </a:br>
+            <a:r>
+              <a:rPr lang="en-US" sz="4400" b="0" i="0" u="none" strike="noStrike" dirty="0">
+                <a:solidFill>
+                  <a:srgbClr val="000000"/>
+                </a:solidFill>
+                <a:effectLst/>
+                <a:latin typeface="Arial" panose="020B0604020202020204" pitchFamily="34" charset="0"/>
+              </a:rPr>
+              <a:t>                        </a:t>
+            </a:r>
+            <a:endParaRPr lang="en-US" sz="2400" dirty="0"/>
+          </a:p>
+        </p:txBody>
+      </p:sp>
+      <p:sp>
+        <p:nvSpPr>
+          <p:cNvPr id="3" name="Subtitle 2">
+            <a:extLst>
+              <a:ext uri="{FF2B5EF4-FFF2-40B4-BE49-F238E27FC236}">
+                <a16:creationId xmlns:a16="http://schemas.microsoft.com/office/drawing/2014/main" id="{49F45D17-E9F7-4B72-9F45-A18DE64ABBE2}"/>
+              </a:ext>
+            </a:extLst>
+          </p:cNvPr>
+          <p:cNvSpPr>
+            <a:spLocks noGrp="1"/>
+          </p:cNvSpPr>
+          <p:nvPr>
+            <p:ph type="subTitle" idx="1"/>
+          </p:nvPr>
+        </p:nvSpPr>
+        <p:spPr>
+          <a:xfrm>
+            <a:off x="-2896998" y="4558383"/>
+            <a:ext cx="9144000" cy="1655762"/>
+          </a:xfrm>
+        </p:spPr>
+        <p:txBody>
+          <a:bodyPr>
+            <a:normAutofit/>
+          </a:bodyPr>
+          <a:lstStyle/>
+          <a:p>
+            <a:br>
+              <a:rPr lang="en-US" dirty="0"/>
+            </a:br>
+            <a:endParaRPr lang="en-US" dirty="0"/>
+          </a:p>
+        </p:txBody>
+      </p:sp>
+    </p:spTree>
+    <p:extLst>
+      <p:ext uri="{BB962C8B-B14F-4D97-AF65-F5344CB8AC3E}">
+        <p14:creationId xmlns:p14="http://schemas.microsoft.com/office/powerpoint/2010/main" val="4047059505"/>
+      </p:ext>
+    </p:extLst>
+  </p:cSld>
+  <p:clrMapOvr>
+    <a:masterClrMapping/>
+  </p:clrMapOvr>
+</p:sld>
+</file>
+
+<file path=ppt/slides/slide9.xml><?xml version="1.0" encoding="utf-8"?>
+<p:sld xmlns:a="http://schemas.openxmlformats.org/drawingml/2006/main" xmlns:r="http://schemas.openxmlformats.org/officeDocument/2006/relationships" xmlns:p="http://schemas.openxmlformats.org/presentationml/2006/main">
+  <p:cSld>
+    <p:spTree>
+      <p:nvGrpSpPr>
+        <p:cNvPr id="1" name=""/>
+        <p:cNvGrpSpPr/>
+        <p:nvPr/>
+      </p:nvGrpSpPr>
+      <p:grpSpPr>
+        <a:xfrm>
+          <a:off x="0" y="0"/>
+          <a:ext cx="0" cy="0"/>
+          <a:chOff x="0" y="0"/>
+          <a:chExt cx="0" cy="0"/>
+        </a:xfrm>
+      </p:grpSpPr>
+      <p:sp>
+        <p:nvSpPr>
+          <p:cNvPr id="2" name="TextBox 1">
+            <a:extLst>
+              <a:ext uri="{FF2B5EF4-FFF2-40B4-BE49-F238E27FC236}">
+                <a16:creationId xmlns:a16="http://schemas.microsoft.com/office/drawing/2014/main" id="{12607C7C-BFF0-472D-A12F-D6A4776DE6C2}"/>
+              </a:ext>
+            </a:extLst>
+          </p:cNvPr>
+          <p:cNvSpPr txBox="1"/>
+          <p:nvPr/>
+        </p:nvSpPr>
+        <p:spPr>
+          <a:xfrm>
+            <a:off x="0" y="201336"/>
+            <a:ext cx="10737908" cy="369332"/>
+          </a:xfrm>
+          <a:prstGeom prst="rect">
+            <a:avLst/>
+          </a:prstGeom>
+          <a:noFill/>
+        </p:spPr>
+        <p:txBody>
+          <a:bodyPr wrap="square" rtlCol="0">
+            <a:spAutoFit/>
+          </a:bodyPr>
+          <a:lstStyle/>
+          <a:p>
+            <a:r>
+              <a:rPr lang="en-US" dirty="0"/>
+              <a:t>Un-supervised Learning for clustering players based on their player statistics:</a:t>
+            </a:r>
+          </a:p>
+        </p:txBody>
+      </p:sp>
+      <p:sp>
+        <p:nvSpPr>
+          <p:cNvPr id="8" name="TextBox 7">
+            <a:extLst>
+              <a:ext uri="{FF2B5EF4-FFF2-40B4-BE49-F238E27FC236}">
+                <a16:creationId xmlns:a16="http://schemas.microsoft.com/office/drawing/2014/main" id="{01C0E6B8-65BD-4537-9414-B982733F8873}"/>
+              </a:ext>
+            </a:extLst>
+          </p:cNvPr>
+          <p:cNvSpPr txBox="1"/>
+          <p:nvPr/>
+        </p:nvSpPr>
+        <p:spPr>
+          <a:xfrm>
+            <a:off x="-13982" y="768902"/>
+            <a:ext cx="11481731" cy="8217634"/>
+          </a:xfrm>
+          <a:prstGeom prst="rect">
+            <a:avLst/>
+          </a:prstGeom>
+          <a:noFill/>
+        </p:spPr>
+        <p:txBody>
+          <a:bodyPr wrap="square" rtlCol="0">
+            <a:spAutoFit/>
+          </a:bodyPr>
+          <a:lstStyle/>
+          <a:p>
+            <a:r>
+              <a:rPr lang="en-US" dirty="0"/>
+              <a:t>Description of preliminary data processing:– </a:t>
+            </a:r>
+          </a:p>
+          <a:p>
+            <a:pPr marL="285750" indent="-285750">
+              <a:buFont typeface="Wingdings" panose="05000000000000000000" pitchFamily="2" charset="2"/>
+              <a:buChar char="Ø"/>
+            </a:pPr>
+            <a:r>
+              <a:rPr lang="en-US" dirty="0"/>
+              <a:t>	- </a:t>
+            </a:r>
+            <a:r>
+              <a:rPr lang="en-US" sz="1500" dirty="0"/>
+              <a:t>Both player salary and player statistics data need to be referenced from database (Status – In- progress)</a:t>
+            </a:r>
+          </a:p>
+          <a:p>
+            <a:pPr marL="285750" indent="-285750">
+              <a:buFont typeface="Wingdings" panose="05000000000000000000" pitchFamily="2" charset="2"/>
+              <a:buChar char="Ø"/>
+            </a:pPr>
+            <a:r>
+              <a:rPr lang="en-US" sz="1500" dirty="0"/>
+              <a:t>	- Consider players who have played all 4 seasons (2016-17, 2018-19,2019-20,2020-21) for machine learning (Status – In-progress)</a:t>
+            </a:r>
+          </a:p>
+          <a:p>
+            <a:pPr marL="285750" indent="-285750">
+              <a:buFont typeface="Wingdings" panose="05000000000000000000" pitchFamily="2" charset="2"/>
+              <a:buChar char="Ø"/>
+            </a:pPr>
+            <a:r>
+              <a:rPr lang="en-US" sz="1500" dirty="0"/>
+              <a:t>                      - Join player statistics and  player salary and average the stats and salary per player (Status - Complete)</a:t>
+            </a:r>
+          </a:p>
+          <a:p>
+            <a:pPr marL="285750" indent="-285750">
+              <a:buFont typeface="Wingdings" panose="05000000000000000000" pitchFamily="2" charset="2"/>
+              <a:buChar char="Ø"/>
+            </a:pPr>
+            <a:r>
+              <a:rPr lang="en-US" sz="1500" dirty="0"/>
+              <a:t>	- Use all player statistics for clustering them through KMeans Model (Status - Complete)</a:t>
+            </a:r>
+          </a:p>
+          <a:p>
+            <a:pPr marL="285750" indent="-285750">
+              <a:buFont typeface="Wingdings" panose="05000000000000000000" pitchFamily="2" charset="2"/>
+              <a:buChar char="Ø"/>
+            </a:pPr>
+            <a:r>
+              <a:rPr lang="en-US" sz="1500" dirty="0"/>
+              <a:t>	- Derive category  of players as player tiers based on the average salary per cluster (Status - Complete)</a:t>
+            </a:r>
+            <a:endParaRPr lang="en-US" dirty="0"/>
+          </a:p>
+          <a:p>
+            <a:endParaRPr lang="en-US" dirty="0"/>
+          </a:p>
+          <a:p>
+            <a:r>
+              <a:rPr lang="en-US" dirty="0"/>
+              <a:t>The code git hub link is as follows:- </a:t>
+            </a:r>
+          </a:p>
+          <a:p>
+            <a:r>
+              <a:rPr lang="en-US" dirty="0"/>
+              <a:t>	</a:t>
+            </a:r>
+            <a:r>
+              <a:rPr lang="en-US" dirty="0">
+                <a:hlinkClick r:id="rId2"/>
+              </a:rPr>
+              <a:t>http://localhost:8888/notebooks/player-clustering.ipynb</a:t>
+            </a:r>
+            <a:endParaRPr lang="en-US" dirty="0"/>
+          </a:p>
+          <a:p>
+            <a:endParaRPr lang="en-US" dirty="0"/>
+          </a:p>
+          <a:p>
+            <a:r>
+              <a:rPr lang="en-US" dirty="0"/>
+              <a:t>Reason why player statics only considered as feature:-</a:t>
+            </a:r>
+          </a:p>
+          <a:p>
+            <a:pPr marL="285750" indent="-285750">
+              <a:buFont typeface="Wingdings" panose="05000000000000000000" pitchFamily="2" charset="2"/>
+              <a:buChar char="ü"/>
+            </a:pPr>
+            <a:r>
+              <a:rPr lang="en-US" dirty="0"/>
+              <a:t>      	 </a:t>
+            </a:r>
+            <a:r>
+              <a:rPr lang="en-US" sz="1500" dirty="0"/>
+              <a:t>Player statistics like ‘np_of_ghames-played’, ‘no_minutes_played’, ‘field_goals_pctg’, ‘three_point_pctg’,    	‘effective_field_goal_pctg’,  ‘free_throws_pctg’, ‘ total_rebounds’ ,’ no_of_assists’ ,’ no_of_steals’,</a:t>
+            </a:r>
+          </a:p>
+          <a:p>
+            <a:r>
+              <a:rPr lang="en-US" sz="1500" dirty="0"/>
+              <a:t>	‘no_of_blocks’,’ no_of_turnovers’, ‘points’ have been considered as features for clustering since these features reflect </a:t>
+            </a:r>
+          </a:p>
+          <a:p>
+            <a:r>
+              <a:rPr lang="en-US" sz="1500" dirty="0"/>
+              <a:t>	the player’s performance. This data is fed to Kmeans as features. </a:t>
+            </a:r>
+          </a:p>
+          <a:p>
+            <a:endParaRPr lang="en-US" dirty="0"/>
+          </a:p>
+          <a:p>
+            <a:r>
+              <a:rPr lang="en-US" dirty="0"/>
+              <a:t>Why KMeans us used, its advantage and limitations:- </a:t>
+            </a:r>
+          </a:p>
+          <a:p>
+            <a:pPr marL="285750" indent="-285750">
+              <a:buFont typeface="Wingdings" panose="05000000000000000000" pitchFamily="2" charset="2"/>
+              <a:buChar char="ü"/>
+            </a:pPr>
+            <a:r>
+              <a:rPr lang="en-US" sz="1500" dirty="0"/>
+              <a:t>    	KMeans is one of the most popular algoritm for un-supervised learning to find patterns and cluster them. </a:t>
+            </a:r>
+          </a:p>
+          <a:p>
+            <a:pPr marL="285750" indent="-285750">
+              <a:buFont typeface="Wingdings" panose="05000000000000000000" pitchFamily="2" charset="2"/>
+              <a:buChar char="ü"/>
+            </a:pPr>
+            <a:r>
+              <a:rPr lang="en-US" sz="1500" dirty="0"/>
+              <a:t>        	Benefits  of Kmeans –  Simple to implement and  scales to large datasets</a:t>
+            </a:r>
+          </a:p>
+          <a:p>
+            <a:pPr marL="285750" indent="-285750">
+              <a:buFont typeface="Wingdings" panose="05000000000000000000" pitchFamily="2" charset="2"/>
+              <a:buChar char="ü"/>
+            </a:pPr>
+            <a:r>
+              <a:rPr lang="en-US" sz="1500" dirty="0"/>
+              <a:t>        	Limitations of Kmeans -  Choosing K Manually to find optimal K. It is always a trial and error method to find the 	optimal K. </a:t>
+            </a:r>
+          </a:p>
+          <a:p>
+            <a:r>
+              <a:rPr lang="en-US" dirty="0"/>
+              <a:t>Conclusion:- </a:t>
+            </a:r>
+          </a:p>
+          <a:p>
+            <a:pPr marL="285750" indent="-285750">
+              <a:buFont typeface="Wingdings" panose="05000000000000000000" pitchFamily="2" charset="2"/>
+              <a:buChar char="ü"/>
+            </a:pPr>
+            <a:r>
+              <a:rPr lang="en-US" dirty="0"/>
+              <a:t>         	</a:t>
+            </a:r>
+            <a:r>
+              <a:rPr lang="en-US" sz="1500" dirty="0"/>
+              <a:t>This whole machine learning modeling is coded on the top of sample data. The value of K will change once the real     	data gets pulled 	in.</a:t>
+            </a:r>
+          </a:p>
+          <a:p>
+            <a:endParaRPr lang="en-US" dirty="0"/>
+          </a:p>
+          <a:p>
+            <a:r>
+              <a:rPr lang="en-US" dirty="0"/>
+              <a:t>         	</a:t>
+            </a:r>
+          </a:p>
+          <a:p>
+            <a:endParaRPr lang="en-US" dirty="0"/>
+          </a:p>
+          <a:p>
+            <a:r>
+              <a:rPr lang="en-US" dirty="0"/>
+              <a:t>        </a:t>
+            </a:r>
+          </a:p>
+          <a:p>
+            <a:endParaRPr lang="en-US" dirty="0"/>
+          </a:p>
+          <a:p>
+            <a:endParaRPr lang="en-US" dirty="0"/>
+          </a:p>
+          <a:p>
+            <a:endParaRPr lang="en-US" dirty="0"/>
+          </a:p>
+          <a:p>
+            <a:endParaRPr lang="en-US" dirty="0"/>
+          </a:p>
+        </p:txBody>
+      </p:sp>
+    </p:spTree>
+    <p:extLst>
+      <p:ext uri="{BB962C8B-B14F-4D97-AF65-F5344CB8AC3E}">
+        <p14:creationId xmlns:p14="http://schemas.microsoft.com/office/powerpoint/2010/main" val="1725604876"/>
       </p:ext>
     </p:extLst>
   </p:cSld>

</xml_diff>

<commit_message>
Updated the Segment-3 Presentation slides with Machine Learninhg content on 08/15
</commit_message>
<xml_diff>
--- a/Presentation/NBA Player Analytics- Week 2 Deliverables.pptx
+++ b/Presentation/NBA Player Analytics- Week 2 Deliverables.pptx
@@ -277,7 +277,7 @@
           <a:p>
             <a:fld id="{A2050751-72FB-4268-8CF0-65061A8511BC}" type="datetimeFigureOut">
               <a:rPr lang="en-US" smtClean="0"/>
-              <a:t>8/8/21</a:t>
+              <a:t>8/15/2021</a:t>
             </a:fld>
             <a:endParaRPr lang="en-US" dirty="0"/>
           </a:p>
@@ -475,7 +475,7 @@
           <a:p>
             <a:fld id="{A2050751-72FB-4268-8CF0-65061A8511BC}" type="datetimeFigureOut">
               <a:rPr lang="en-US" smtClean="0"/>
-              <a:t>8/8/21</a:t>
+              <a:t>8/15/2021</a:t>
             </a:fld>
             <a:endParaRPr lang="en-US" dirty="0"/>
           </a:p>
@@ -683,7 +683,7 @@
           <a:p>
             <a:fld id="{A2050751-72FB-4268-8CF0-65061A8511BC}" type="datetimeFigureOut">
               <a:rPr lang="en-US" smtClean="0"/>
-              <a:t>8/8/21</a:t>
+              <a:t>8/15/2021</a:t>
             </a:fld>
             <a:endParaRPr lang="en-US" dirty="0"/>
           </a:p>
@@ -881,7 +881,7 @@
           <a:p>
             <a:fld id="{A2050751-72FB-4268-8CF0-65061A8511BC}" type="datetimeFigureOut">
               <a:rPr lang="en-US" smtClean="0"/>
-              <a:t>8/8/21</a:t>
+              <a:t>8/15/2021</a:t>
             </a:fld>
             <a:endParaRPr lang="en-US" dirty="0"/>
           </a:p>
@@ -1156,7 +1156,7 @@
           <a:p>
             <a:fld id="{A2050751-72FB-4268-8CF0-65061A8511BC}" type="datetimeFigureOut">
               <a:rPr lang="en-US" smtClean="0"/>
-              <a:t>8/8/21</a:t>
+              <a:t>8/15/2021</a:t>
             </a:fld>
             <a:endParaRPr lang="en-US" dirty="0"/>
           </a:p>
@@ -1421,7 +1421,7 @@
           <a:p>
             <a:fld id="{A2050751-72FB-4268-8CF0-65061A8511BC}" type="datetimeFigureOut">
               <a:rPr lang="en-US" smtClean="0"/>
-              <a:t>8/8/21</a:t>
+              <a:t>8/15/2021</a:t>
             </a:fld>
             <a:endParaRPr lang="en-US" dirty="0"/>
           </a:p>
@@ -1833,7 +1833,7 @@
           <a:p>
             <a:fld id="{A2050751-72FB-4268-8CF0-65061A8511BC}" type="datetimeFigureOut">
               <a:rPr lang="en-US" smtClean="0"/>
-              <a:t>8/8/21</a:t>
+              <a:t>8/15/2021</a:t>
             </a:fld>
             <a:endParaRPr lang="en-US" dirty="0"/>
           </a:p>
@@ -1974,7 +1974,7 @@
           <a:p>
             <a:fld id="{A2050751-72FB-4268-8CF0-65061A8511BC}" type="datetimeFigureOut">
               <a:rPr lang="en-US" smtClean="0"/>
-              <a:t>8/8/21</a:t>
+              <a:t>8/15/2021</a:t>
             </a:fld>
             <a:endParaRPr lang="en-US" dirty="0"/>
           </a:p>
@@ -2087,7 +2087,7 @@
           <a:p>
             <a:fld id="{A2050751-72FB-4268-8CF0-65061A8511BC}" type="datetimeFigureOut">
               <a:rPr lang="en-US" smtClean="0"/>
-              <a:t>8/8/21</a:t>
+              <a:t>8/15/2021</a:t>
             </a:fld>
             <a:endParaRPr lang="en-US" dirty="0"/>
           </a:p>
@@ -2398,7 +2398,7 @@
           <a:p>
             <a:fld id="{A2050751-72FB-4268-8CF0-65061A8511BC}" type="datetimeFigureOut">
               <a:rPr lang="en-US" smtClean="0"/>
-              <a:t>8/8/21</a:t>
+              <a:t>8/15/2021</a:t>
             </a:fld>
             <a:endParaRPr lang="en-US" dirty="0"/>
           </a:p>
@@ -2686,7 +2686,7 @@
           <a:p>
             <a:fld id="{A2050751-72FB-4268-8CF0-65061A8511BC}" type="datetimeFigureOut">
               <a:rPr lang="en-US" smtClean="0"/>
-              <a:t>8/8/21</a:t>
+              <a:t>8/15/2021</a:t>
             </a:fld>
             <a:endParaRPr lang="en-US" dirty="0"/>
           </a:p>
@@ -2927,7 +2927,7 @@
           <a:p>
             <a:fld id="{A2050751-72FB-4268-8CF0-65061A8511BC}" type="datetimeFigureOut">
               <a:rPr lang="en-US" smtClean="0"/>
-              <a:t>8/8/21</a:t>
+              <a:t>8/15/2021</a:t>
             </a:fld>
             <a:endParaRPr lang="en-US" dirty="0"/>
           </a:p>
@@ -3738,7 +3738,7 @@
             </a:pPr>
             <a:r>
               <a:rPr lang="en-US" sz="1500" dirty="0"/>
-              <a:t>    	Randomforest  is one of the most popular algoritm for supervised learning to do more accurate predictions.</a:t>
+              <a:t>    	Randomforest  is one of the most popular algorithm for supervised learning to do more accurate predictions.</a:t>
             </a:r>
           </a:p>
           <a:p>

</xml_diff>